<commit_message>
added email to ppt
</commit_message>
<xml_diff>
--- a/DWD - Javascript Games - Theorie.pptx
+++ b/DWD - Javascript Games - Theorie.pptx
@@ -9485,7 +9485,12 @@
             <p:ph type="body" sz="quarter" idx="14"/>
           </p:nvPr>
         </p:nvSpPr>
-        <p:spPr/>
+        <p:spPr>
+          <a:xfrm>
+            <a:off x="1440603" y="4493298"/>
+            <a:ext cx="5455147" cy="1617663"/>
+          </a:xfrm>
+        </p:spPr>
         <p:txBody>
           <a:bodyPr/>
           <a:lstStyle/>
@@ -9493,6 +9498,12 @@
             <a:r>
               <a:rPr lang="nl-BE" dirty="0"/>
               <a:t>27 april 2021</a:t>
+            </a:r>
+          </a:p>
+          <a:p>
+            <a:r>
+              <a:rPr lang="nl-BE" dirty="0"/>
+              <a:t>dmitriy.vanderelst@student.arteveldehs.be</a:t>
             </a:r>
           </a:p>
         </p:txBody>

</xml_diff>

<commit_message>
added pictures to some slides
</commit_message>
<xml_diff>
--- a/DWD - Javascript Games - Theorie.pptx
+++ b/DWD - Javascript Games - Theorie.pptx
@@ -5,7 +5,7 @@
     <p:sldMasterId id="2147483648" r:id="rId1"/>
   </p:sldMasterIdLst>
   <p:notesMasterIdLst>
-    <p:notesMasterId r:id="rId42"/>
+    <p:notesMasterId r:id="rId43"/>
   </p:notesMasterIdLst>
   <p:sldIdLst>
     <p:sldId id="261" r:id="rId2"/>
@@ -46,8 +46,9 @@
     <p:sldId id="284" r:id="rId37"/>
     <p:sldId id="283" r:id="rId38"/>
     <p:sldId id="298" r:id="rId39"/>
-    <p:sldId id="304" r:id="rId40"/>
-    <p:sldId id="305" r:id="rId41"/>
+    <p:sldId id="320" r:id="rId40"/>
+    <p:sldId id="304" r:id="rId41"/>
+    <p:sldId id="305" r:id="rId42"/>
   </p:sldIdLst>
   <p:sldSz cx="12192000" cy="6858000"/>
   <p:notesSz cx="6858000" cy="9144000"/>
@@ -236,7 +237,7 @@
           <a:p>
             <a:fld id="{D8EBF3A7-A7E5-42B6-9154-500A7CB5E3E8}" type="datetimeFigureOut">
               <a:rPr lang="nl-BE" smtClean="0"/>
-              <a:t>26/04/2021</a:t>
+              <a:t>27/04/2021</a:t>
             </a:fld>
             <a:endParaRPr lang="nl-BE"/>
           </a:p>
@@ -12291,8 +12292,8 @@
         </p:nvSpPr>
         <p:spPr>
           <a:xfrm>
-            <a:off x="922789" y="2223082"/>
-            <a:ext cx="9988811" cy="2816917"/>
+            <a:off x="922789" y="1633714"/>
+            <a:ext cx="9988811" cy="3406286"/>
           </a:xfrm>
         </p:spPr>
         <p:txBody>
@@ -12418,6 +12419,45 @@
           </a:p>
         </p:txBody>
       </p:sp>
+      <p:pic>
+        <p:nvPicPr>
+          <p:cNvPr id="7" name="Picture 6" descr="Icon&#10;&#10;Description automatically generated with medium confidence">
+            <a:extLst>
+              <a:ext uri="{FF2B5EF4-FFF2-40B4-BE49-F238E27FC236}">
+                <a16:creationId xmlns:a16="http://schemas.microsoft.com/office/drawing/2014/main" id="{7C8AF728-C747-46EB-9034-3BF4A73351FF}"/>
+              </a:ext>
+            </a:extLst>
+          </p:cNvPr>
+          <p:cNvPicPr>
+            <a:picLocks noChangeAspect="1"/>
+          </p:cNvPicPr>
+          <p:nvPr/>
+        </p:nvPicPr>
+        <p:blipFill>
+          <a:blip r:embed="rId2">
+            <a:extLst>
+              <a:ext uri="{28A0092B-C50C-407E-A947-70E740481C1C}">
+                <a14:useLocalDpi xmlns:a14="http://schemas.microsoft.com/office/drawing/2010/main" val="0"/>
+              </a:ext>
+              <a:ext uri="{837473B0-CC2E-450A-ABE3-18F120FF3D39}">
+                <a1611:picAttrSrcUrl xmlns:a1611="http://schemas.microsoft.com/office/drawing/2016/11/main" r:id="rId3"/>
+              </a:ext>
+            </a:extLst>
+          </a:blip>
+          <a:stretch>
+            <a:fillRect/>
+          </a:stretch>
+        </p:blipFill>
+        <p:spPr>
+          <a:xfrm>
+            <a:off x="4577768" y="3388500"/>
+            <a:ext cx="5905500" cy="2857500"/>
+          </a:xfrm>
+          <a:prstGeom prst="rect">
+            <a:avLst/>
+          </a:prstGeom>
+        </p:spPr>
+      </p:pic>
     </p:spTree>
     <p:extLst>
       <p:ext uri="{BB962C8B-B14F-4D97-AF65-F5344CB8AC3E}">
@@ -13252,6 +13292,45 @@
           </a:p>
         </p:txBody>
       </p:sp>
+      <p:pic>
+        <p:nvPicPr>
+          <p:cNvPr id="7" name="Picture 6" descr="A picture containing text, outdoor&#10;&#10;Description automatically generated">
+            <a:extLst>
+              <a:ext uri="{FF2B5EF4-FFF2-40B4-BE49-F238E27FC236}">
+                <a16:creationId xmlns:a16="http://schemas.microsoft.com/office/drawing/2014/main" id="{A6AC9009-8079-44E6-B81E-5041DB18648A}"/>
+              </a:ext>
+            </a:extLst>
+          </p:cNvPr>
+          <p:cNvPicPr>
+            <a:picLocks noChangeAspect="1"/>
+          </p:cNvPicPr>
+          <p:nvPr/>
+        </p:nvPicPr>
+        <p:blipFill>
+          <a:blip r:embed="rId2">
+            <a:extLst>
+              <a:ext uri="{28A0092B-C50C-407E-A947-70E740481C1C}">
+                <a14:useLocalDpi xmlns:a14="http://schemas.microsoft.com/office/drawing/2010/main" val="0"/>
+              </a:ext>
+              <a:ext uri="{837473B0-CC2E-450A-ABE3-18F120FF3D39}">
+                <a1611:picAttrSrcUrl xmlns:a1611="http://schemas.microsoft.com/office/drawing/2016/11/main" r:id="rId3"/>
+              </a:ext>
+            </a:extLst>
+          </a:blip>
+          <a:stretch>
+            <a:fillRect/>
+          </a:stretch>
+        </p:blipFill>
+        <p:spPr>
+          <a:xfrm>
+            <a:off x="6810594" y="2026710"/>
+            <a:ext cx="4847115" cy="3013290"/>
+          </a:xfrm>
+          <a:prstGeom prst="rect">
+            <a:avLst/>
+          </a:prstGeom>
+        </p:spPr>
+      </p:pic>
     </p:spTree>
     <p:extLst>
       <p:ext uri="{BB962C8B-B14F-4D97-AF65-F5344CB8AC3E}">
@@ -14572,7 +14651,7 @@
           <p:cNvPr id="2" name="Titel 1">
             <a:extLst>
               <a:ext uri="{FF2B5EF4-FFF2-40B4-BE49-F238E27FC236}">
-                <a16:creationId xmlns:a16="http://schemas.microsoft.com/office/drawing/2014/main" id="{C5EEAFBD-B5B8-4F85-98E4-19C38B628AD3}"/>
+                <a16:creationId xmlns:a16="http://schemas.microsoft.com/office/drawing/2014/main" id="{465F132B-C9CE-4FCE-923D-CCAFB92AB8C8}"/>
               </a:ext>
             </a:extLst>
           </p:cNvPr>
@@ -14590,52 +14669,303 @@
           <a:p>
             <a:r>
               <a:rPr lang="nl-BE" dirty="0"/>
-              <a:t>Opdracht </a:t>
-            </a:r>
-            <a:r>
-              <a:rPr lang="nl-BE"/>
-              <a:t>(Optioneel)</a:t>
-            </a:r>
-            <a:endParaRPr lang="nl-BE" dirty="0"/>
-          </a:p>
-        </p:txBody>
-      </p:sp>
-      <p:sp>
-        <p:nvSpPr>
-          <p:cNvPr id="3" name="Tijdelijke aanduiding voor tekst 2">
-            <a:extLst>
-              <a:ext uri="{FF2B5EF4-FFF2-40B4-BE49-F238E27FC236}">
-                <a16:creationId xmlns:a16="http://schemas.microsoft.com/office/drawing/2014/main" id="{25E6300B-AC24-4FB2-A05D-06BE75683545}"/>
-              </a:ext>
-            </a:extLst>
-          </p:cNvPr>
-          <p:cNvSpPr>
-            <a:spLocks noGrp="1"/>
-          </p:cNvSpPr>
-          <p:nvPr>
-            <p:ph type="body" idx="1"/>
-          </p:nvPr>
-        </p:nvSpPr>
-        <p:spPr/>
-        <p:txBody>
-          <a:bodyPr/>
-          <a:lstStyle/>
-          <a:p>
+              <a:t>Three.js - </a:t>
+            </a:r>
             <a:r>
               <a:rPr lang="nl-BE" dirty="0" err="1"/>
-              <a:t>What</a:t>
-            </a:r>
-            <a:r>
-              <a:rPr lang="nl-BE" dirty="0"/>
+              <a:t>gITF</a:t>
+            </a:r>
+            <a:r>
+              <a:rPr lang="nl-BE" dirty="0"/>
+              <a:t> export</a:t>
+            </a:r>
+          </a:p>
+        </p:txBody>
+      </p:sp>
+      <p:sp>
+        <p:nvSpPr>
+          <p:cNvPr id="8" name="Tijdelijke aanduiding voor inhoud 7">
+            <a:extLst>
+              <a:ext uri="{FF2B5EF4-FFF2-40B4-BE49-F238E27FC236}">
+                <a16:creationId xmlns:a16="http://schemas.microsoft.com/office/drawing/2014/main" id="{46660B48-BEE8-4738-9228-05126E64F4BB}"/>
+              </a:ext>
+            </a:extLst>
+          </p:cNvPr>
+          <p:cNvSpPr>
+            <a:spLocks noGrp="1"/>
+          </p:cNvSpPr>
+          <p:nvPr>
+            <p:ph idx="1"/>
+          </p:nvPr>
+        </p:nvSpPr>
+        <p:spPr>
+          <a:xfrm>
+            <a:off x="964734" y="1484851"/>
+            <a:ext cx="7544497" cy="4076639"/>
+          </a:xfrm>
+        </p:spPr>
+        <p:txBody>
+          <a:bodyPr/>
+          <a:lstStyle/>
+          <a:p>
+            <a:r>
+              <a:rPr lang="nl-BE" dirty="0"/>
+              <a:t>Het is ook mogelijk om 3D-modellen te importeren die je hebt gemaakt in software zoals:</a:t>
+            </a:r>
+          </a:p>
+          <a:p>
+            <a:pPr lvl="1"/>
+            <a:r>
+              <a:rPr lang="nl-BE" sz="2000" b="1" dirty="0"/>
+              <a:t>Blender</a:t>
+            </a:r>
+            <a:r>
+              <a:rPr lang="nl-BE" sz="2000" dirty="0"/>
               <a:t> </a:t>
             </a:r>
             <a:r>
-              <a:rPr lang="nl-BE" dirty="0" err="1"/>
-              <a:t>to</a:t>
-            </a:r>
-            <a:r>
-              <a:rPr lang="nl-BE" dirty="0"/>
-              <a:t> do?</a:t>
+              <a:rPr lang="nl-BE" sz="2000" dirty="0" err="1"/>
+              <a:t>by</a:t>
+            </a:r>
+            <a:r>
+              <a:rPr lang="nl-BE" sz="2000" dirty="0"/>
+              <a:t> </a:t>
+            </a:r>
+            <a:r>
+              <a:rPr lang="nl-BE" sz="2000" dirty="0" err="1"/>
+              <a:t>the</a:t>
+            </a:r>
+            <a:r>
+              <a:rPr lang="nl-BE" sz="2000" dirty="0"/>
+              <a:t> Blender Foundation</a:t>
+            </a:r>
+          </a:p>
+          <a:p>
+            <a:pPr lvl="1"/>
+            <a:r>
+              <a:rPr lang="nl-BE" sz="2000" b="1" dirty="0" err="1"/>
+              <a:t>Substance</a:t>
+            </a:r>
+            <a:r>
+              <a:rPr lang="nl-BE" sz="2000" b="1" dirty="0"/>
+              <a:t> </a:t>
+            </a:r>
+            <a:r>
+              <a:rPr lang="nl-BE" sz="2000" b="1" dirty="0" err="1"/>
+              <a:t>Painter</a:t>
+            </a:r>
+            <a:r>
+              <a:rPr lang="nl-BE" sz="2000" b="1" dirty="0"/>
+              <a:t> </a:t>
+            </a:r>
+            <a:r>
+              <a:rPr lang="nl-BE" sz="2000" dirty="0" err="1"/>
+              <a:t>by</a:t>
+            </a:r>
+            <a:r>
+              <a:rPr lang="nl-BE" sz="2000" dirty="0"/>
+              <a:t> </a:t>
+            </a:r>
+            <a:r>
+              <a:rPr lang="nl-BE" sz="2000" dirty="0" err="1"/>
+              <a:t>Allegorithmic</a:t>
+            </a:r>
+            <a:endParaRPr lang="nl-BE" sz="2000" dirty="0"/>
+          </a:p>
+          <a:p>
+            <a:pPr lvl="1"/>
+            <a:r>
+              <a:rPr lang="nl-BE" sz="2000" b="1" dirty="0" err="1"/>
+              <a:t>Modo</a:t>
+            </a:r>
+            <a:r>
+              <a:rPr lang="nl-BE" sz="2000" dirty="0"/>
+              <a:t> </a:t>
+            </a:r>
+            <a:r>
+              <a:rPr lang="nl-BE" sz="2000" dirty="0" err="1"/>
+              <a:t>by</a:t>
+            </a:r>
+            <a:r>
+              <a:rPr lang="nl-BE" sz="2000" dirty="0"/>
+              <a:t> </a:t>
+            </a:r>
+            <a:r>
+              <a:rPr lang="nl-BE" sz="2000" dirty="0" err="1"/>
+              <a:t>Foundry</a:t>
+            </a:r>
+            <a:endParaRPr lang="nl-BE" sz="2000" dirty="0"/>
+          </a:p>
+          <a:p>
+            <a:pPr lvl="1"/>
+            <a:r>
+              <a:rPr lang="nl-BE" sz="2000" b="1" dirty="0" err="1"/>
+              <a:t>Toolbag</a:t>
+            </a:r>
+            <a:r>
+              <a:rPr lang="nl-BE" sz="2000" dirty="0"/>
+              <a:t> </a:t>
+            </a:r>
+            <a:r>
+              <a:rPr lang="nl-BE" sz="2000" dirty="0" err="1"/>
+              <a:t>by</a:t>
+            </a:r>
+            <a:r>
+              <a:rPr lang="nl-BE" sz="2000" dirty="0"/>
+              <a:t> </a:t>
+            </a:r>
+            <a:r>
+              <a:rPr lang="nl-BE" sz="2000" dirty="0" err="1"/>
+              <a:t>Marmoset</a:t>
+            </a:r>
+            <a:endParaRPr lang="nl-BE" sz="2000" dirty="0"/>
+          </a:p>
+          <a:p>
+            <a:pPr lvl="1"/>
+            <a:r>
+              <a:rPr lang="nl-BE" sz="2000" b="1" dirty="0" err="1"/>
+              <a:t>Houdini</a:t>
+            </a:r>
+            <a:r>
+              <a:rPr lang="nl-BE" sz="2000" dirty="0"/>
+              <a:t> </a:t>
+            </a:r>
+            <a:r>
+              <a:rPr lang="nl-BE" sz="2000" dirty="0" err="1"/>
+              <a:t>by</a:t>
+            </a:r>
+            <a:r>
+              <a:rPr lang="nl-BE" sz="2000" dirty="0"/>
+              <a:t> </a:t>
+            </a:r>
+            <a:r>
+              <a:rPr lang="nl-BE" sz="2000" dirty="0" err="1"/>
+              <a:t>SideFX</a:t>
+            </a:r>
+            <a:endParaRPr lang="nl-BE" sz="2000" dirty="0"/>
+          </a:p>
+          <a:p>
+            <a:pPr lvl="1"/>
+            <a:r>
+              <a:rPr lang="nl-BE" sz="2000" b="1" dirty="0"/>
+              <a:t>Cinema 4D </a:t>
+            </a:r>
+            <a:r>
+              <a:rPr lang="nl-BE" sz="2000" dirty="0" err="1"/>
+              <a:t>by</a:t>
+            </a:r>
+            <a:r>
+              <a:rPr lang="nl-BE" sz="2000" dirty="0"/>
+              <a:t> MAXON</a:t>
+            </a:r>
+          </a:p>
+          <a:p>
+            <a:pPr lvl="1"/>
+            <a:r>
+              <a:rPr lang="nl-BE" sz="2000" b="1" dirty="0"/>
+              <a:t>COLLADA2GLTF</a:t>
+            </a:r>
+            <a:r>
+              <a:rPr lang="nl-BE" sz="2000" dirty="0"/>
+              <a:t> </a:t>
+            </a:r>
+            <a:r>
+              <a:rPr lang="nl-BE" sz="2000" dirty="0" err="1"/>
+              <a:t>by</a:t>
+            </a:r>
+            <a:r>
+              <a:rPr lang="nl-BE" sz="2000" dirty="0"/>
+              <a:t> </a:t>
+            </a:r>
+            <a:r>
+              <a:rPr lang="nl-BE" sz="2000" dirty="0" err="1"/>
+              <a:t>the</a:t>
+            </a:r>
+            <a:r>
+              <a:rPr lang="nl-BE" sz="2000" dirty="0"/>
+              <a:t> </a:t>
+            </a:r>
+            <a:r>
+              <a:rPr lang="nl-BE" sz="2000" dirty="0" err="1"/>
+              <a:t>Khronos</a:t>
+            </a:r>
+            <a:r>
+              <a:rPr lang="nl-BE" sz="2000" dirty="0"/>
+              <a:t> Group</a:t>
+            </a:r>
+          </a:p>
+          <a:p>
+            <a:pPr lvl="1"/>
+            <a:r>
+              <a:rPr lang="nl-BE" sz="2000" b="1" dirty="0"/>
+              <a:t>FBX2GLTF</a:t>
+            </a:r>
+            <a:r>
+              <a:rPr lang="nl-BE" sz="2000" dirty="0"/>
+              <a:t> </a:t>
+            </a:r>
+            <a:r>
+              <a:rPr lang="nl-BE" sz="2000" dirty="0" err="1"/>
+              <a:t>by</a:t>
+            </a:r>
+            <a:r>
+              <a:rPr lang="nl-BE" sz="2000" dirty="0"/>
+              <a:t> Facebook</a:t>
+            </a:r>
+          </a:p>
+          <a:p>
+            <a:pPr lvl="1"/>
+            <a:r>
+              <a:rPr lang="nl-BE" sz="2000" b="1" dirty="0"/>
+              <a:t>OBJ2GLTF</a:t>
+            </a:r>
+            <a:r>
+              <a:rPr lang="nl-BE" sz="2000" dirty="0"/>
+              <a:t> </a:t>
+            </a:r>
+            <a:r>
+              <a:rPr lang="nl-BE" sz="2000" dirty="0" err="1"/>
+              <a:t>by</a:t>
+            </a:r>
+            <a:r>
+              <a:rPr lang="nl-BE" sz="2000" dirty="0"/>
+              <a:t> </a:t>
+            </a:r>
+            <a:r>
+              <a:rPr lang="nl-BE" sz="2000" dirty="0" err="1"/>
+              <a:t>Analytical</a:t>
+            </a:r>
+            <a:r>
+              <a:rPr lang="nl-BE" sz="2000" dirty="0"/>
+              <a:t> Graphics </a:t>
+            </a:r>
+            <a:r>
+              <a:rPr lang="nl-BE" sz="2000" dirty="0" err="1"/>
+              <a:t>Inc</a:t>
+            </a:r>
+            <a:endParaRPr lang="nl-BE" sz="2000" dirty="0"/>
+          </a:p>
+          <a:p>
+            <a:pPr lvl="1"/>
+            <a:r>
+              <a:rPr lang="nl-BE" sz="2000" dirty="0"/>
+              <a:t>…</a:t>
+            </a:r>
+            <a:r>
+              <a:rPr lang="nl-BE" sz="2000" dirty="0" err="1"/>
+              <a:t>and</a:t>
+            </a:r>
+            <a:r>
+              <a:rPr lang="nl-BE" sz="2000" dirty="0"/>
+              <a:t> </a:t>
+            </a:r>
+            <a:r>
+              <a:rPr lang="nl-BE" sz="2000" b="1" dirty="0" err="1"/>
+              <a:t>many</a:t>
+            </a:r>
+            <a:r>
+              <a:rPr lang="nl-BE" sz="2000" b="1" dirty="0"/>
+              <a:t> more</a:t>
             </a:r>
           </a:p>
         </p:txBody>
@@ -14645,7 +14975,7 @@
           <p:cNvPr id="4" name="Tijdelijke aanduiding voor voettekst 3">
             <a:extLst>
               <a:ext uri="{FF2B5EF4-FFF2-40B4-BE49-F238E27FC236}">
-                <a16:creationId xmlns:a16="http://schemas.microsoft.com/office/drawing/2014/main" id="{7926BCFD-3A9A-492A-A57B-0A991170A3B7}"/>
+                <a16:creationId xmlns:a16="http://schemas.microsoft.com/office/drawing/2014/main" id="{9A86A9FB-1B9E-4B7A-910C-235D3A566A80}"/>
               </a:ext>
             </a:extLst>
           </p:cNvPr>
@@ -14673,7 +15003,7 @@
           <p:cNvPr id="5" name="Tijdelijke aanduiding voor dianummer 4">
             <a:extLst>
               <a:ext uri="{FF2B5EF4-FFF2-40B4-BE49-F238E27FC236}">
-                <a16:creationId xmlns:a16="http://schemas.microsoft.com/office/drawing/2014/main" id="{60BD1991-93F2-4440-9BAB-7167DEBBD3C1}"/>
+                <a16:creationId xmlns:a16="http://schemas.microsoft.com/office/drawing/2014/main" id="{A64CFB49-2F18-4019-89DD-E4922E4505C1}"/>
               </a:ext>
             </a:extLst>
           </p:cNvPr>
@@ -14691,7 +15021,6 @@
           <a:p>
             <a:fld id="{FF88DA20-ED00-471C-9170-60F590CB400A}" type="slidenum">
               <a:rPr lang="nl-BE" smtClean="0"/>
-              <a:pPr/>
               <a:t>39</a:t>
             </a:fld>
             <a:endParaRPr lang="nl-BE"/>
@@ -14700,10 +15029,10 @@
       </p:sp>
       <p:sp>
         <p:nvSpPr>
-          <p:cNvPr id="6" name="Tijdelijke aanduiding voor tekst 5">
-            <a:extLst>
-              <a:ext uri="{FF2B5EF4-FFF2-40B4-BE49-F238E27FC236}">
-                <a16:creationId xmlns:a16="http://schemas.microsoft.com/office/drawing/2014/main" id="{2BC75DC7-FD2B-4961-80F5-1A77FF877DD9}"/>
+          <p:cNvPr id="3" name="Tijdelijke aanduiding voor tekst 2">
+            <a:extLst>
+              <a:ext uri="{FF2B5EF4-FFF2-40B4-BE49-F238E27FC236}">
+                <a16:creationId xmlns:a16="http://schemas.microsoft.com/office/drawing/2014/main" id="{8007CC32-F96E-4CD9-95CF-403FC6BFF49B}"/>
               </a:ext>
             </a:extLst>
           </p:cNvPr>
@@ -14719,14 +15048,64 @@
           <a:bodyPr/>
           <a:lstStyle/>
           <a:p>
-            <a:endParaRPr lang="nl-BE"/>
-          </a:p>
-        </p:txBody>
-      </p:sp>
+            <a:r>
+              <a:rPr lang="nl-BE" dirty="0"/>
+              <a:t>Extra’s</a:t>
+            </a:r>
+          </a:p>
+        </p:txBody>
+      </p:sp>
+      <p:pic>
+        <p:nvPicPr>
+          <p:cNvPr id="5124" name="Picture 4" descr="Developing 3D Web Apps With Three.js | by Tom Castagna | JavaScript in  Plain English">
+            <a:extLst>
+              <a:ext uri="{FF2B5EF4-FFF2-40B4-BE49-F238E27FC236}">
+                <a16:creationId xmlns:a16="http://schemas.microsoft.com/office/drawing/2014/main" id="{7AE9964E-0B44-45D6-A69B-CD7EC14FC46C}"/>
+              </a:ext>
+            </a:extLst>
+          </p:cNvPr>
+          <p:cNvPicPr>
+            <a:picLocks noChangeAspect="1" noChangeArrowheads="1"/>
+          </p:cNvPicPr>
+          <p:nvPr/>
+        </p:nvPicPr>
+        <p:blipFill>
+          <a:blip r:embed="rId2">
+            <a:extLst>
+              <a:ext uri="{28A0092B-C50C-407E-A947-70E740481C1C}">
+                <a14:useLocalDpi xmlns:a14="http://schemas.microsoft.com/office/drawing/2010/main" val="0"/>
+              </a:ext>
+            </a:extLst>
+          </a:blip>
+          <a:srcRect/>
+          <a:stretch>
+            <a:fillRect/>
+          </a:stretch>
+        </p:blipFill>
+        <p:spPr bwMode="auto">
+          <a:xfrm>
+            <a:off x="6470706" y="2913190"/>
+            <a:ext cx="4625524" cy="2338318"/>
+          </a:xfrm>
+          <a:prstGeom prst="rect">
+            <a:avLst/>
+          </a:prstGeom>
+          <a:noFill/>
+          <a:extLst>
+            <a:ext uri="{909E8E84-426E-40DD-AFC4-6F175D3DCCD1}">
+              <a14:hiddenFill xmlns:a14="http://schemas.microsoft.com/office/drawing/2010/main">
+                <a:solidFill>
+                  <a:srgbClr val="FFFFFF"/>
+                </a:solidFill>
+              </a14:hiddenFill>
+            </a:ext>
+          </a:extLst>
+        </p:spPr>
+      </p:pic>
     </p:spTree>
     <p:extLst>
       <p:ext uri="{BB962C8B-B14F-4D97-AF65-F5344CB8AC3E}">
-        <p14:creationId xmlns:p14="http://schemas.microsoft.com/office/powerpoint/2010/main" val="3162246282"/>
+        <p14:creationId xmlns:p14="http://schemas.microsoft.com/office/powerpoint/2010/main" val="3491309351"/>
       </p:ext>
     </p:extLst>
   </p:cSld>
@@ -14929,6 +15308,192 @@
           <p:cNvPr id="2" name="Titel 1">
             <a:extLst>
               <a:ext uri="{FF2B5EF4-FFF2-40B4-BE49-F238E27FC236}">
+                <a16:creationId xmlns:a16="http://schemas.microsoft.com/office/drawing/2014/main" id="{C5EEAFBD-B5B8-4F85-98E4-19C38B628AD3}"/>
+              </a:ext>
+            </a:extLst>
+          </p:cNvPr>
+          <p:cNvSpPr>
+            <a:spLocks noGrp="1"/>
+          </p:cNvSpPr>
+          <p:nvPr>
+            <p:ph type="title"/>
+          </p:nvPr>
+        </p:nvSpPr>
+        <p:spPr/>
+        <p:txBody>
+          <a:bodyPr/>
+          <a:lstStyle/>
+          <a:p>
+            <a:r>
+              <a:rPr lang="nl-BE" dirty="0"/>
+              <a:t>Opdracht </a:t>
+            </a:r>
+            <a:r>
+              <a:rPr lang="nl-BE"/>
+              <a:t>(Optioneel)</a:t>
+            </a:r>
+            <a:endParaRPr lang="nl-BE" dirty="0"/>
+          </a:p>
+        </p:txBody>
+      </p:sp>
+      <p:sp>
+        <p:nvSpPr>
+          <p:cNvPr id="3" name="Tijdelijke aanduiding voor tekst 2">
+            <a:extLst>
+              <a:ext uri="{FF2B5EF4-FFF2-40B4-BE49-F238E27FC236}">
+                <a16:creationId xmlns:a16="http://schemas.microsoft.com/office/drawing/2014/main" id="{25E6300B-AC24-4FB2-A05D-06BE75683545}"/>
+              </a:ext>
+            </a:extLst>
+          </p:cNvPr>
+          <p:cNvSpPr>
+            <a:spLocks noGrp="1"/>
+          </p:cNvSpPr>
+          <p:nvPr>
+            <p:ph type="body" idx="1"/>
+          </p:nvPr>
+        </p:nvSpPr>
+        <p:spPr/>
+        <p:txBody>
+          <a:bodyPr/>
+          <a:lstStyle/>
+          <a:p>
+            <a:r>
+              <a:rPr lang="nl-BE" dirty="0" err="1"/>
+              <a:t>What</a:t>
+            </a:r>
+            <a:r>
+              <a:rPr lang="nl-BE" dirty="0"/>
+              <a:t> </a:t>
+            </a:r>
+            <a:r>
+              <a:rPr lang="nl-BE" dirty="0" err="1"/>
+              <a:t>to</a:t>
+            </a:r>
+            <a:r>
+              <a:rPr lang="nl-BE" dirty="0"/>
+              <a:t> do?</a:t>
+            </a:r>
+          </a:p>
+        </p:txBody>
+      </p:sp>
+      <p:sp>
+        <p:nvSpPr>
+          <p:cNvPr id="4" name="Tijdelijke aanduiding voor voettekst 3">
+            <a:extLst>
+              <a:ext uri="{FF2B5EF4-FFF2-40B4-BE49-F238E27FC236}">
+                <a16:creationId xmlns:a16="http://schemas.microsoft.com/office/drawing/2014/main" id="{7926BCFD-3A9A-492A-A57B-0A991170A3B7}"/>
+              </a:ext>
+            </a:extLst>
+          </p:cNvPr>
+          <p:cNvSpPr>
+            <a:spLocks noGrp="1"/>
+          </p:cNvSpPr>
+          <p:nvPr>
+            <p:ph type="ftr" sz="quarter" idx="11"/>
+          </p:nvPr>
+        </p:nvSpPr>
+        <p:spPr/>
+        <p:txBody>
+          <a:bodyPr/>
+          <a:lstStyle/>
+          <a:p>
+            <a:r>
+              <a:rPr lang="nl-BE" dirty="0"/>
+              <a:t>DWD – HTML5 &amp; Games</a:t>
+            </a:r>
+          </a:p>
+        </p:txBody>
+      </p:sp>
+      <p:sp>
+        <p:nvSpPr>
+          <p:cNvPr id="5" name="Tijdelijke aanduiding voor dianummer 4">
+            <a:extLst>
+              <a:ext uri="{FF2B5EF4-FFF2-40B4-BE49-F238E27FC236}">
+                <a16:creationId xmlns:a16="http://schemas.microsoft.com/office/drawing/2014/main" id="{60BD1991-93F2-4440-9BAB-7167DEBBD3C1}"/>
+              </a:ext>
+            </a:extLst>
+          </p:cNvPr>
+          <p:cNvSpPr>
+            <a:spLocks noGrp="1"/>
+          </p:cNvSpPr>
+          <p:nvPr>
+            <p:ph type="sldNum" sz="quarter" idx="12"/>
+          </p:nvPr>
+        </p:nvSpPr>
+        <p:spPr/>
+        <p:txBody>
+          <a:bodyPr/>
+          <a:lstStyle/>
+          <a:p>
+            <a:fld id="{FF88DA20-ED00-471C-9170-60F590CB400A}" type="slidenum">
+              <a:rPr lang="nl-BE" smtClean="0"/>
+              <a:pPr/>
+              <a:t>40</a:t>
+            </a:fld>
+            <a:endParaRPr lang="nl-BE"/>
+          </a:p>
+        </p:txBody>
+      </p:sp>
+      <p:sp>
+        <p:nvSpPr>
+          <p:cNvPr id="6" name="Tijdelijke aanduiding voor tekst 5">
+            <a:extLst>
+              <a:ext uri="{FF2B5EF4-FFF2-40B4-BE49-F238E27FC236}">
+                <a16:creationId xmlns:a16="http://schemas.microsoft.com/office/drawing/2014/main" id="{2BC75DC7-FD2B-4961-80F5-1A77FF877DD9}"/>
+              </a:ext>
+            </a:extLst>
+          </p:cNvPr>
+          <p:cNvSpPr>
+            <a:spLocks noGrp="1"/>
+          </p:cNvSpPr>
+          <p:nvPr>
+            <p:ph type="body" sz="quarter" idx="13"/>
+          </p:nvPr>
+        </p:nvSpPr>
+        <p:spPr/>
+        <p:txBody>
+          <a:bodyPr/>
+          <a:lstStyle/>
+          <a:p>
+            <a:endParaRPr lang="nl-BE"/>
+          </a:p>
+        </p:txBody>
+      </p:sp>
+    </p:spTree>
+    <p:extLst>
+      <p:ext uri="{BB962C8B-B14F-4D97-AF65-F5344CB8AC3E}">
+        <p14:creationId xmlns:p14="http://schemas.microsoft.com/office/powerpoint/2010/main" val="3162246282"/>
+      </p:ext>
+    </p:extLst>
+  </p:cSld>
+  <p:clrMapOvr>
+    <a:masterClrMapping/>
+  </p:clrMapOvr>
+</p:sld>
+</file>
+
+<file path=ppt/slides/slide41.xml><?xml version="1.0" encoding="utf-8"?>
+<p:sld xmlns:a="http://schemas.openxmlformats.org/drawingml/2006/main" xmlns:r="http://schemas.openxmlformats.org/officeDocument/2006/relationships" xmlns:p="http://schemas.openxmlformats.org/presentationml/2006/main">
+  <p:cSld>
+    <p:spTree>
+      <p:nvGrpSpPr>
+        <p:cNvPr id="1" name=""/>
+        <p:cNvGrpSpPr/>
+        <p:nvPr/>
+      </p:nvGrpSpPr>
+      <p:grpSpPr>
+        <a:xfrm>
+          <a:off x="0" y="0"/>
+          <a:ext cx="0" cy="0"/>
+          <a:chOff x="0" y="0"/>
+          <a:chExt cx="0" cy="0"/>
+        </a:xfrm>
+      </p:grpSpPr>
+      <p:sp>
+        <p:nvSpPr>
+          <p:cNvPr id="2" name="Titel 1">
+            <a:extLst>
+              <a:ext uri="{FF2B5EF4-FFF2-40B4-BE49-F238E27FC236}">
                 <a16:creationId xmlns:a16="http://schemas.microsoft.com/office/drawing/2014/main" id="{465F132B-C9CE-4FCE-923D-CCAFB92AB8C8}"/>
               </a:ext>
             </a:extLst>
@@ -15100,7 +15665,7 @@
           <a:p>
             <a:fld id="{FF88DA20-ED00-471C-9170-60F590CB400A}" type="slidenum">
               <a:rPr lang="nl-BE" smtClean="0"/>
-              <a:t>40</a:t>
+              <a:t>41</a:t>
             </a:fld>
             <a:endParaRPr lang="nl-BE"/>
           </a:p>

</xml_diff>